<commit_message>
updated projectDescription file again
</commit_message>
<xml_diff>
--- a/projectDescription.pptx
+++ b/projectDescription.pptx
@@ -3596,17 +3596,7 @@
                   </a:schemeClr>
                 </a:solidFill>
               </a:rPr>
-              <a:t>kPi</a:t>
-            </a:r>
-            <a:r>
-              <a:rPr lang="en-GB" b="1" dirty="0" err="1" smtClean="0">
-                <a:solidFill>
-                  <a:schemeClr val="accent4">
-                    <a:lumMod val="75000"/>
-                  </a:schemeClr>
-                </a:solidFill>
-              </a:rPr>
-              <a:t>_inhibits_R</a:t>
+              <a:t>kPi_inhibits_R</a:t>
             </a:r>
             <a:r>
               <a:rPr lang="en-GB" b="1" dirty="0" smtClean="0">
@@ -3778,7 +3768,7 @@
         </p:blipFill>
         <p:spPr>
           <a:xfrm>
-            <a:off x="2586159" y="0"/>
+            <a:off x="1662517" y="0"/>
             <a:ext cx="7019682" cy="6858000"/>
           </a:xfrm>
           <a:prstGeom prst="rect">
@@ -3809,7 +3799,7 @@
         </p:blipFill>
         <p:spPr bwMode="auto">
           <a:xfrm>
-            <a:off x="7803284" y="2155537"/>
+            <a:off x="6879642" y="2155537"/>
             <a:ext cx="1533525" cy="409575"/>
           </a:xfrm>
           <a:prstGeom prst="rect">
@@ -3850,7 +3840,7 @@
         </p:blipFill>
         <p:spPr bwMode="auto">
           <a:xfrm>
-            <a:off x="1228437" y="1362479"/>
+            <a:off x="304795" y="1362479"/>
             <a:ext cx="1676400" cy="400050"/>
           </a:xfrm>
           <a:prstGeom prst="rect">
@@ -3891,7 +3881,7 @@
         </p:blipFill>
         <p:spPr bwMode="auto">
           <a:xfrm>
-            <a:off x="1874982" y="4529290"/>
+            <a:off x="951340" y="4529290"/>
             <a:ext cx="630387" cy="630387"/>
           </a:xfrm>
           <a:prstGeom prst="rect">
@@ -3932,7 +3922,7 @@
         </p:blipFill>
         <p:spPr bwMode="auto">
           <a:xfrm>
-            <a:off x="3536094" y="3160859"/>
+            <a:off x="2612452" y="3160859"/>
             <a:ext cx="269288" cy="293768"/>
           </a:xfrm>
           <a:prstGeom prst="rect">
@@ -3973,7 +3963,7 @@
         </p:blipFill>
         <p:spPr bwMode="auto">
           <a:xfrm>
-            <a:off x="6745731" y="3160859"/>
+            <a:off x="5822089" y="3160859"/>
             <a:ext cx="269288" cy="293768"/>
           </a:xfrm>
           <a:prstGeom prst="rect">
@@ -4014,7 +4004,7 @@
         </p:blipFill>
         <p:spPr bwMode="auto">
           <a:xfrm>
-            <a:off x="3643029" y="6342500"/>
+            <a:off x="2719387" y="6342500"/>
             <a:ext cx="269288" cy="293768"/>
           </a:xfrm>
           <a:prstGeom prst="rect">
@@ -4032,6 +4022,331 @@
           </a:extLst>
         </p:spPr>
       </p:pic>
+      <p:cxnSp>
+        <p:nvCxnSpPr>
+          <p:cNvPr id="3" name="Straight Connector 2"/>
+          <p:cNvCxnSpPr/>
+          <p:nvPr/>
+        </p:nvCxnSpPr>
+        <p:spPr>
+          <a:xfrm>
+            <a:off x="8996218" y="729673"/>
+            <a:ext cx="692727" cy="0"/>
+          </a:xfrm>
+          <a:prstGeom prst="line">
+            <a:avLst/>
+          </a:prstGeom>
+          <a:ln w="76200">
+            <a:solidFill>
+              <a:schemeClr val="tx1"/>
+            </a:solidFill>
+          </a:ln>
+        </p:spPr>
+        <p:style>
+          <a:lnRef idx="1">
+            <a:schemeClr val="accent1"/>
+          </a:lnRef>
+          <a:fillRef idx="0">
+            <a:schemeClr val="accent1"/>
+          </a:fillRef>
+          <a:effectRef idx="0">
+            <a:schemeClr val="accent1"/>
+          </a:effectRef>
+          <a:fontRef idx="minor">
+            <a:schemeClr val="tx1"/>
+          </a:fontRef>
+        </p:style>
+      </p:cxnSp>
+      <p:sp>
+        <p:nvSpPr>
+          <p:cNvPr id="5" name="TextBox 4"/>
+          <p:cNvSpPr txBox="1"/>
+          <p:nvPr/>
+        </p:nvSpPr>
+        <p:spPr>
+          <a:xfrm>
+            <a:off x="9984509" y="471055"/>
+            <a:ext cx="1819564" cy="646331"/>
+          </a:xfrm>
+          <a:prstGeom prst="rect">
+            <a:avLst/>
+          </a:prstGeom>
+          <a:noFill/>
+        </p:spPr>
+        <p:txBody>
+          <a:bodyPr wrap="square" rtlCol="0">
+            <a:spAutoFit/>
+          </a:bodyPr>
+          <a:lstStyle/>
+          <a:p>
+            <a:r>
+              <a:rPr lang="nl-NL" dirty="0" smtClean="0"/>
+              <a:t>M,O,I=0</a:t>
+            </a:r>
+            <a:br>
+              <a:rPr lang="nl-NL" dirty="0" smtClean="0"/>
+            </a:br>
+            <a:r>
+              <a:rPr lang="nl-NL" dirty="0" smtClean="0"/>
+              <a:t>N=[0,1]</a:t>
+            </a:r>
+            <a:endParaRPr lang="en-GB" dirty="0"/>
+          </a:p>
+        </p:txBody>
+      </p:sp>
+      <p:sp>
+        <p:nvSpPr>
+          <p:cNvPr id="12" name="TextBox 11"/>
+          <p:cNvSpPr txBox="1"/>
+          <p:nvPr/>
+        </p:nvSpPr>
+        <p:spPr>
+          <a:xfrm>
+            <a:off x="10039921" y="1239338"/>
+            <a:ext cx="1967352" cy="923330"/>
+          </a:xfrm>
+          <a:prstGeom prst="rect">
+            <a:avLst/>
+          </a:prstGeom>
+          <a:noFill/>
+        </p:spPr>
+        <p:txBody>
+          <a:bodyPr wrap="square" rtlCol="0">
+            <a:spAutoFit/>
+          </a:bodyPr>
+          <a:lstStyle/>
+          <a:p>
+            <a:r>
+              <a:rPr lang="nl-NL" dirty="0" smtClean="0"/>
+              <a:t>M,I=0</a:t>
+            </a:r>
+            <a:br>
+              <a:rPr lang="nl-NL" dirty="0" smtClean="0"/>
+            </a:br>
+            <a:r>
+              <a:rPr lang="nl-NL" dirty="0" smtClean="0"/>
+              <a:t>O=[0,infinity]</a:t>
+            </a:r>
+            <a:br>
+              <a:rPr lang="nl-NL" dirty="0" smtClean="0"/>
+            </a:br>
+            <a:r>
+              <a:rPr lang="nl-NL" dirty="0" smtClean="0"/>
+              <a:t>N=discrete </a:t>
+            </a:r>
+            <a:r>
+              <a:rPr lang="nl-NL" dirty="0" err="1" smtClean="0"/>
+              <a:t>values</a:t>
+            </a:r>
+            <a:endParaRPr lang="en-GB" dirty="0"/>
+          </a:p>
+        </p:txBody>
+      </p:sp>
+      <p:cxnSp>
+        <p:nvCxnSpPr>
+          <p:cNvPr id="13" name="Straight Connector 12"/>
+          <p:cNvCxnSpPr/>
+          <p:nvPr/>
+        </p:nvCxnSpPr>
+        <p:spPr>
+          <a:xfrm>
+            <a:off x="9014690" y="1556325"/>
+            <a:ext cx="692727" cy="0"/>
+          </a:xfrm>
+          <a:prstGeom prst="line">
+            <a:avLst/>
+          </a:prstGeom>
+          <a:ln w="76200">
+            <a:solidFill>
+              <a:srgbClr val="FF0000"/>
+            </a:solidFill>
+          </a:ln>
+        </p:spPr>
+        <p:style>
+          <a:lnRef idx="1">
+            <a:schemeClr val="accent1"/>
+          </a:lnRef>
+          <a:fillRef idx="0">
+            <a:schemeClr val="accent1"/>
+          </a:fillRef>
+          <a:effectRef idx="0">
+            <a:schemeClr val="accent1"/>
+          </a:effectRef>
+          <a:fontRef idx="minor">
+            <a:schemeClr val="tx1"/>
+          </a:fontRef>
+        </p:style>
+      </p:cxnSp>
+      <p:cxnSp>
+        <p:nvCxnSpPr>
+          <p:cNvPr id="14" name="Straight Connector 13"/>
+          <p:cNvCxnSpPr/>
+          <p:nvPr/>
+        </p:nvCxnSpPr>
+        <p:spPr>
+          <a:xfrm>
+            <a:off x="9014690" y="2583582"/>
+            <a:ext cx="692727" cy="0"/>
+          </a:xfrm>
+          <a:prstGeom prst="line">
+            <a:avLst/>
+          </a:prstGeom>
+          <a:ln w="76200">
+            <a:solidFill>
+              <a:srgbClr val="00FF00"/>
+            </a:solidFill>
+          </a:ln>
+        </p:spPr>
+        <p:style>
+          <a:lnRef idx="1">
+            <a:schemeClr val="accent1"/>
+          </a:lnRef>
+          <a:fillRef idx="0">
+            <a:schemeClr val="accent1"/>
+          </a:fillRef>
+          <a:effectRef idx="0">
+            <a:schemeClr val="accent1"/>
+          </a:effectRef>
+          <a:fontRef idx="minor">
+            <a:schemeClr val="tx1"/>
+          </a:fontRef>
+        </p:style>
+      </p:cxnSp>
+      <p:sp>
+        <p:nvSpPr>
+          <p:cNvPr id="15" name="TextBox 14"/>
+          <p:cNvSpPr txBox="1"/>
+          <p:nvPr/>
+        </p:nvSpPr>
+        <p:spPr>
+          <a:xfrm>
+            <a:off x="9984509" y="2317380"/>
+            <a:ext cx="2022764" cy="923330"/>
+          </a:xfrm>
+          <a:prstGeom prst="rect">
+            <a:avLst/>
+          </a:prstGeom>
+          <a:noFill/>
+        </p:spPr>
+        <p:txBody>
+          <a:bodyPr wrap="square" rtlCol="0">
+            <a:spAutoFit/>
+          </a:bodyPr>
+          <a:lstStyle/>
+          <a:p>
+            <a:r>
+              <a:rPr lang="nl-NL" dirty="0" smtClean="0"/>
+              <a:t>M,O=0</a:t>
+            </a:r>
+            <a:br>
+              <a:rPr lang="nl-NL" dirty="0" smtClean="0"/>
+            </a:br>
+            <a:r>
+              <a:rPr lang="nl-NL" dirty="0" smtClean="0"/>
+              <a:t>I=[0,1]</a:t>
+            </a:r>
+            <a:br>
+              <a:rPr lang="nl-NL" dirty="0" smtClean="0"/>
+            </a:br>
+            <a:r>
+              <a:rPr lang="nl-NL" dirty="0" smtClean="0"/>
+              <a:t>N=discrete </a:t>
+            </a:r>
+            <a:r>
+              <a:rPr lang="nl-NL" dirty="0" err="1" smtClean="0"/>
+              <a:t>values</a:t>
+            </a:r>
+            <a:endParaRPr lang="en-GB" dirty="0"/>
+          </a:p>
+        </p:txBody>
+      </p:sp>
+      <p:cxnSp>
+        <p:nvCxnSpPr>
+          <p:cNvPr id="16" name="Straight Connector 15"/>
+          <p:cNvCxnSpPr/>
+          <p:nvPr/>
+        </p:nvCxnSpPr>
+        <p:spPr>
+          <a:xfrm>
+            <a:off x="9014690" y="3698796"/>
+            <a:ext cx="692727" cy="0"/>
+          </a:xfrm>
+          <a:prstGeom prst="line">
+            <a:avLst/>
+          </a:prstGeom>
+          <a:ln w="76200">
+            <a:solidFill>
+              <a:srgbClr val="0000FF"/>
+            </a:solidFill>
+          </a:ln>
+        </p:spPr>
+        <p:style>
+          <a:lnRef idx="1">
+            <a:schemeClr val="accent1"/>
+          </a:lnRef>
+          <a:fillRef idx="0">
+            <a:schemeClr val="accent1"/>
+          </a:fillRef>
+          <a:effectRef idx="0">
+            <a:schemeClr val="accent1"/>
+          </a:effectRef>
+          <a:fontRef idx="minor">
+            <a:schemeClr val="tx1"/>
+          </a:fontRef>
+        </p:style>
+      </p:cxnSp>
+      <p:sp>
+        <p:nvSpPr>
+          <p:cNvPr id="17" name="TextBox 16"/>
+          <p:cNvSpPr txBox="1"/>
+          <p:nvPr/>
+        </p:nvSpPr>
+        <p:spPr>
+          <a:xfrm>
+            <a:off x="9984509" y="3432594"/>
+            <a:ext cx="2022764" cy="923330"/>
+          </a:xfrm>
+          <a:prstGeom prst="rect">
+            <a:avLst/>
+          </a:prstGeom>
+          <a:noFill/>
+        </p:spPr>
+        <p:txBody>
+          <a:bodyPr wrap="square" rtlCol="0">
+            <a:spAutoFit/>
+          </a:bodyPr>
+          <a:lstStyle/>
+          <a:p>
+            <a:r>
+              <a:rPr lang="nl-NL" dirty="0"/>
+              <a:t>I</a:t>
+            </a:r>
+            <a:r>
+              <a:rPr lang="nl-NL" dirty="0" smtClean="0"/>
+              <a:t>,O=0</a:t>
+            </a:r>
+            <a:br>
+              <a:rPr lang="nl-NL" dirty="0" smtClean="0"/>
+            </a:br>
+            <a:r>
+              <a:rPr lang="nl-NL" dirty="0" smtClean="0"/>
+              <a:t>M=[0,infinity]</a:t>
+            </a:r>
+            <a:br>
+              <a:rPr lang="nl-NL" dirty="0" smtClean="0"/>
+            </a:br>
+            <a:r>
+              <a:rPr lang="nl-NL" dirty="0" smtClean="0"/>
+              <a:t>N=discrete </a:t>
+            </a:r>
+            <a:r>
+              <a:rPr lang="nl-NL" dirty="0" err="1" smtClean="0"/>
+              <a:t>values</a:t>
+            </a:r>
+            <a:endParaRPr lang="en-GB" dirty="0"/>
+          </a:p>
+        </p:txBody>
+      </p:sp>
     </p:spTree>
     <p:extLst>
       <p:ext uri="{BB962C8B-B14F-4D97-AF65-F5344CB8AC3E}">
@@ -4507,6 +4822,420 @@
               <a:t>t</a:t>
             </a:r>
             <a:endParaRPr lang="en-GB" sz="5400" dirty="0"/>
+          </a:p>
+        </p:txBody>
+      </p:sp>
+      <p:sp>
+        <p:nvSpPr>
+          <p:cNvPr id="14" name="TextBox 13"/>
+          <p:cNvSpPr txBox="1"/>
+          <p:nvPr/>
+        </p:nvSpPr>
+        <p:spPr>
+          <a:xfrm>
+            <a:off x="3152786" y="2801894"/>
+            <a:ext cx="1819564" cy="738664"/>
+          </a:xfrm>
+          <a:prstGeom prst="rect">
+            <a:avLst/>
+          </a:prstGeom>
+          <a:noFill/>
+        </p:spPr>
+        <p:txBody>
+          <a:bodyPr wrap="square" rtlCol="0">
+            <a:spAutoFit/>
+          </a:bodyPr>
+          <a:lstStyle/>
+          <a:p>
+            <a:r>
+              <a:rPr lang="nl-NL" sz="1400" dirty="0" smtClean="0"/>
+              <a:t>Step up in O</a:t>
+            </a:r>
+          </a:p>
+          <a:p>
+            <a:r>
+              <a:rPr lang="nl-NL" sz="1400" dirty="0" smtClean="0"/>
+              <a:t>N=constant</a:t>
+            </a:r>
+            <a:r>
+              <a:rPr lang="nl-NL" sz="1400" dirty="0" smtClean="0"/>
+              <a:t/>
+            </a:r>
+            <a:br>
+              <a:rPr lang="nl-NL" sz="1400" dirty="0" smtClean="0"/>
+            </a:br>
+            <a:r>
+              <a:rPr lang="nl-NL" sz="1400" dirty="0" err="1" smtClean="0"/>
+              <a:t>with</a:t>
+            </a:r>
+            <a:r>
+              <a:rPr lang="nl-NL" sz="1400" dirty="0" smtClean="0"/>
+              <a:t> I,M=0</a:t>
+            </a:r>
+            <a:endParaRPr lang="en-GB" sz="1400" dirty="0"/>
+          </a:p>
+        </p:txBody>
+      </p:sp>
+      <p:sp>
+        <p:nvSpPr>
+          <p:cNvPr id="16" name="TextBox 15"/>
+          <p:cNvSpPr txBox="1"/>
+          <p:nvPr/>
+        </p:nvSpPr>
+        <p:spPr>
+          <a:xfrm>
+            <a:off x="3152786" y="4455606"/>
+            <a:ext cx="1819564" cy="738664"/>
+          </a:xfrm>
+          <a:prstGeom prst="rect">
+            <a:avLst/>
+          </a:prstGeom>
+          <a:noFill/>
+        </p:spPr>
+        <p:txBody>
+          <a:bodyPr wrap="square" rtlCol="0">
+            <a:spAutoFit/>
+          </a:bodyPr>
+          <a:lstStyle/>
+          <a:p>
+            <a:r>
+              <a:rPr lang="nl-NL" sz="1400" dirty="0" smtClean="0"/>
+              <a:t>Step up in M</a:t>
+            </a:r>
+          </a:p>
+          <a:p>
+            <a:r>
+              <a:rPr lang="nl-NL" sz="1400" dirty="0" smtClean="0"/>
+              <a:t>N=constant</a:t>
+            </a:r>
+            <a:r>
+              <a:rPr lang="nl-NL" sz="1400" dirty="0" smtClean="0"/>
+              <a:t/>
+            </a:r>
+            <a:br>
+              <a:rPr lang="nl-NL" sz="1400" dirty="0" smtClean="0"/>
+            </a:br>
+            <a:r>
+              <a:rPr lang="nl-NL" sz="1400" dirty="0" err="1" smtClean="0"/>
+              <a:t>with</a:t>
+            </a:r>
+            <a:r>
+              <a:rPr lang="nl-NL" sz="1400" dirty="0" smtClean="0"/>
+              <a:t> I,O=0</a:t>
+            </a:r>
+            <a:endParaRPr lang="en-GB" sz="1400" dirty="0"/>
+          </a:p>
+        </p:txBody>
+      </p:sp>
+      <p:sp>
+        <p:nvSpPr>
+          <p:cNvPr id="17" name="TextBox 16"/>
+          <p:cNvSpPr txBox="1"/>
+          <p:nvPr/>
+        </p:nvSpPr>
+        <p:spPr>
+          <a:xfrm>
+            <a:off x="6422059" y="1574990"/>
+            <a:ext cx="1819564" cy="523220"/>
+          </a:xfrm>
+          <a:prstGeom prst="rect">
+            <a:avLst/>
+          </a:prstGeom>
+          <a:noFill/>
+        </p:spPr>
+        <p:txBody>
+          <a:bodyPr wrap="square" rtlCol="0">
+            <a:spAutoFit/>
+          </a:bodyPr>
+          <a:lstStyle/>
+          <a:p>
+            <a:r>
+              <a:rPr lang="nl-NL" sz="1400" dirty="0" smtClean="0"/>
+              <a:t>Step up in N</a:t>
+            </a:r>
+            <a:br>
+              <a:rPr lang="nl-NL" sz="1400" dirty="0" smtClean="0"/>
+            </a:br>
+            <a:r>
+              <a:rPr lang="nl-NL" sz="1400" dirty="0" err="1" smtClean="0"/>
+              <a:t>with</a:t>
+            </a:r>
+            <a:r>
+              <a:rPr lang="nl-NL" sz="1400" dirty="0" smtClean="0"/>
+              <a:t> I,O,M=0</a:t>
+            </a:r>
+            <a:endParaRPr lang="en-GB" sz="1400" dirty="0"/>
+          </a:p>
+        </p:txBody>
+      </p:sp>
+      <p:sp>
+        <p:nvSpPr>
+          <p:cNvPr id="18" name="TextBox 17"/>
+          <p:cNvSpPr txBox="1"/>
+          <p:nvPr/>
+        </p:nvSpPr>
+        <p:spPr>
+          <a:xfrm>
+            <a:off x="9117246" y="1132250"/>
+            <a:ext cx="1819564" cy="523220"/>
+          </a:xfrm>
+          <a:prstGeom prst="rect">
+            <a:avLst/>
+          </a:prstGeom>
+          <a:noFill/>
+        </p:spPr>
+        <p:txBody>
+          <a:bodyPr wrap="square" rtlCol="0">
+            <a:spAutoFit/>
+          </a:bodyPr>
+          <a:lstStyle/>
+          <a:p>
+            <a:r>
+              <a:rPr lang="nl-NL" sz="1400" dirty="0" smtClean="0"/>
+              <a:t>Step  down in N</a:t>
+            </a:r>
+            <a:br>
+              <a:rPr lang="nl-NL" sz="1400" dirty="0" smtClean="0"/>
+            </a:br>
+            <a:r>
+              <a:rPr lang="nl-NL" sz="1400" dirty="0" err="1" smtClean="0"/>
+              <a:t>with</a:t>
+            </a:r>
+            <a:r>
+              <a:rPr lang="nl-NL" sz="1400" dirty="0" smtClean="0"/>
+              <a:t> I,O,M=0</a:t>
+            </a:r>
+            <a:endParaRPr lang="en-GB" sz="1400" dirty="0"/>
+          </a:p>
+        </p:txBody>
+      </p:sp>
+      <p:sp>
+        <p:nvSpPr>
+          <p:cNvPr id="20" name="TextBox 19"/>
+          <p:cNvSpPr txBox="1"/>
+          <p:nvPr/>
+        </p:nvSpPr>
+        <p:spPr>
+          <a:xfrm>
+            <a:off x="5638798" y="2752779"/>
+            <a:ext cx="1819564" cy="738664"/>
+          </a:xfrm>
+          <a:prstGeom prst="rect">
+            <a:avLst/>
+          </a:prstGeom>
+          <a:noFill/>
+        </p:spPr>
+        <p:txBody>
+          <a:bodyPr wrap="square" rtlCol="0">
+            <a:spAutoFit/>
+          </a:bodyPr>
+          <a:lstStyle/>
+          <a:p>
+            <a:r>
+              <a:rPr lang="nl-NL" sz="1400" dirty="0" smtClean="0"/>
+              <a:t>Step up in N</a:t>
+            </a:r>
+            <a:br>
+              <a:rPr lang="nl-NL" sz="1400" dirty="0" smtClean="0"/>
+            </a:br>
+            <a:r>
+              <a:rPr lang="nl-NL" sz="1400" dirty="0" err="1" smtClean="0"/>
+              <a:t>with</a:t>
+            </a:r>
+            <a:r>
+              <a:rPr lang="nl-NL" sz="1400" dirty="0" smtClean="0"/>
+              <a:t> I,M=0</a:t>
+            </a:r>
+          </a:p>
+          <a:p>
+            <a:r>
+              <a:rPr lang="nl-NL" sz="1400" dirty="0" err="1"/>
+              <a:t>a</a:t>
+            </a:r>
+            <a:r>
+              <a:rPr lang="nl-NL" sz="1400" dirty="0" err="1" smtClean="0"/>
+              <a:t>nd</a:t>
+            </a:r>
+            <a:r>
+              <a:rPr lang="nl-NL" sz="1400" dirty="0" smtClean="0"/>
+              <a:t> O=discrete </a:t>
+            </a:r>
+            <a:r>
+              <a:rPr lang="nl-NL" sz="1400" dirty="0" err="1" smtClean="0"/>
+              <a:t>values</a:t>
+            </a:r>
+            <a:endParaRPr lang="en-GB" sz="1400" dirty="0"/>
+          </a:p>
+        </p:txBody>
+      </p:sp>
+      <p:sp>
+        <p:nvSpPr>
+          <p:cNvPr id="22" name="TextBox 21"/>
+          <p:cNvSpPr txBox="1"/>
+          <p:nvPr/>
+        </p:nvSpPr>
+        <p:spPr>
+          <a:xfrm>
+            <a:off x="9117246" y="4455606"/>
+            <a:ext cx="1819564" cy="954107"/>
+          </a:xfrm>
+          <a:prstGeom prst="rect">
+            <a:avLst/>
+          </a:prstGeom>
+          <a:noFill/>
+        </p:spPr>
+        <p:txBody>
+          <a:bodyPr wrap="square" rtlCol="0">
+            <a:spAutoFit/>
+          </a:bodyPr>
+          <a:lstStyle/>
+          <a:p>
+            <a:r>
+              <a:rPr lang="nl-NL" sz="1400" dirty="0" smtClean="0"/>
+              <a:t>Step down in N</a:t>
+            </a:r>
+            <a:br>
+              <a:rPr lang="nl-NL" sz="1400" dirty="0" smtClean="0"/>
+            </a:br>
+            <a:r>
+              <a:rPr lang="nl-NL" sz="1400" dirty="0" err="1" smtClean="0"/>
+              <a:t>with</a:t>
+            </a:r>
+            <a:r>
+              <a:rPr lang="nl-NL" sz="1400" dirty="0" smtClean="0"/>
+              <a:t> I,O=0</a:t>
+            </a:r>
+            <a:br>
+              <a:rPr lang="nl-NL" sz="1400" dirty="0" smtClean="0"/>
+            </a:br>
+            <a:r>
+              <a:rPr lang="nl-NL" sz="1400" dirty="0" err="1" smtClean="0"/>
+              <a:t>and</a:t>
+            </a:r>
+            <a:r>
+              <a:rPr lang="nl-NL" sz="1400" dirty="0" smtClean="0"/>
+              <a:t> M= discrete </a:t>
+            </a:r>
+            <a:r>
+              <a:rPr lang="nl-NL" sz="1400" dirty="0" err="1" smtClean="0"/>
+              <a:t>values</a:t>
+            </a:r>
+            <a:endParaRPr lang="en-GB" sz="1400" dirty="0"/>
+          </a:p>
+        </p:txBody>
+      </p:sp>
+      <p:sp>
+        <p:nvSpPr>
+          <p:cNvPr id="23" name="TextBox 22"/>
+          <p:cNvSpPr txBox="1"/>
+          <p:nvPr/>
+        </p:nvSpPr>
+        <p:spPr>
+          <a:xfrm>
+            <a:off x="9117246" y="2739313"/>
+            <a:ext cx="1819564" cy="738664"/>
+          </a:xfrm>
+          <a:prstGeom prst="rect">
+            <a:avLst/>
+          </a:prstGeom>
+          <a:noFill/>
+        </p:spPr>
+        <p:txBody>
+          <a:bodyPr wrap="square" rtlCol="0">
+            <a:spAutoFit/>
+          </a:bodyPr>
+          <a:lstStyle/>
+          <a:p>
+            <a:r>
+              <a:rPr lang="nl-NL" sz="1400" dirty="0" smtClean="0"/>
+              <a:t>Step down in N</a:t>
+            </a:r>
+            <a:br>
+              <a:rPr lang="nl-NL" sz="1400" dirty="0" smtClean="0"/>
+            </a:br>
+            <a:r>
+              <a:rPr lang="nl-NL" sz="1400" dirty="0" err="1" smtClean="0"/>
+              <a:t>with</a:t>
+            </a:r>
+            <a:r>
+              <a:rPr lang="nl-NL" sz="1400" dirty="0" smtClean="0"/>
+              <a:t> I,M=0</a:t>
+            </a:r>
+          </a:p>
+          <a:p>
+            <a:r>
+              <a:rPr lang="nl-NL" sz="1400" dirty="0" err="1"/>
+              <a:t>a</a:t>
+            </a:r>
+            <a:r>
+              <a:rPr lang="nl-NL" sz="1400" dirty="0" err="1" smtClean="0"/>
+              <a:t>nd</a:t>
+            </a:r>
+            <a:r>
+              <a:rPr lang="nl-NL" sz="1400" dirty="0" smtClean="0"/>
+              <a:t> O=discrete </a:t>
+            </a:r>
+            <a:r>
+              <a:rPr lang="nl-NL" sz="1400" dirty="0" err="1" smtClean="0"/>
+              <a:t>values</a:t>
+            </a:r>
+            <a:endParaRPr lang="en-GB" sz="1400" dirty="0"/>
+          </a:p>
+        </p:txBody>
+      </p:sp>
+      <p:sp>
+        <p:nvSpPr>
+          <p:cNvPr id="24" name="TextBox 23"/>
+          <p:cNvSpPr txBox="1"/>
+          <p:nvPr/>
+        </p:nvSpPr>
+        <p:spPr>
+          <a:xfrm>
+            <a:off x="5690554" y="4455606"/>
+            <a:ext cx="1819564" cy="954107"/>
+          </a:xfrm>
+          <a:prstGeom prst="rect">
+            <a:avLst/>
+          </a:prstGeom>
+          <a:noFill/>
+        </p:spPr>
+        <p:txBody>
+          <a:bodyPr wrap="square" rtlCol="0">
+            <a:spAutoFit/>
+          </a:bodyPr>
+          <a:lstStyle/>
+          <a:p>
+            <a:r>
+              <a:rPr lang="nl-NL" sz="1400" dirty="0" smtClean="0"/>
+              <a:t>Step down in N</a:t>
+            </a:r>
+            <a:br>
+              <a:rPr lang="nl-NL" sz="1400" dirty="0" smtClean="0"/>
+            </a:br>
+            <a:r>
+              <a:rPr lang="nl-NL" sz="1400" dirty="0" err="1" smtClean="0"/>
+              <a:t>with</a:t>
+            </a:r>
+            <a:r>
+              <a:rPr lang="nl-NL" sz="1400" dirty="0" smtClean="0"/>
+              <a:t> I,O=0</a:t>
+            </a:r>
+            <a:br>
+              <a:rPr lang="nl-NL" sz="1400" dirty="0" smtClean="0"/>
+            </a:br>
+            <a:r>
+              <a:rPr lang="nl-NL" sz="1400" dirty="0" err="1" smtClean="0"/>
+              <a:t>and</a:t>
+            </a:r>
+            <a:r>
+              <a:rPr lang="nl-NL" sz="1400" dirty="0" smtClean="0"/>
+              <a:t> M= discrete </a:t>
+            </a:r>
+            <a:r>
+              <a:rPr lang="nl-NL" sz="1400" dirty="0" err="1" smtClean="0"/>
+              <a:t>values</a:t>
+            </a:r>
+            <a:endParaRPr lang="en-GB" sz="1400" dirty="0"/>
           </a:p>
         </p:txBody>
       </p:sp>

</xml_diff>

<commit_message>
updated gamma equation on projectDescription.pptx
</commit_message>
<xml_diff>
--- a/projectDescription.pptx
+++ b/projectDescription.pptx
@@ -246,7 +246,7 @@
           <a:p>
             <a:fld id="{7CC9B9C6-CD82-4E96-B6AA-3311BE7ABF0D}" type="datetimeFigureOut">
               <a:rPr lang="en-GB" smtClean="0"/>
-              <a:t>31/01/2022</a:t>
+              <a:t>01/02/2022</a:t>
             </a:fld>
             <a:endParaRPr lang="en-GB"/>
           </a:p>
@@ -416,7 +416,7 @@
           <a:p>
             <a:fld id="{7CC9B9C6-CD82-4E96-B6AA-3311BE7ABF0D}" type="datetimeFigureOut">
               <a:rPr lang="en-GB" smtClean="0"/>
-              <a:t>31/01/2022</a:t>
+              <a:t>01/02/2022</a:t>
             </a:fld>
             <a:endParaRPr lang="en-GB"/>
           </a:p>
@@ -596,7 +596,7 @@
           <a:p>
             <a:fld id="{7CC9B9C6-CD82-4E96-B6AA-3311BE7ABF0D}" type="datetimeFigureOut">
               <a:rPr lang="en-GB" smtClean="0"/>
-              <a:t>31/01/2022</a:t>
+              <a:t>01/02/2022</a:t>
             </a:fld>
             <a:endParaRPr lang="en-GB"/>
           </a:p>
@@ -766,7 +766,7 @@
           <a:p>
             <a:fld id="{7CC9B9C6-CD82-4E96-B6AA-3311BE7ABF0D}" type="datetimeFigureOut">
               <a:rPr lang="en-GB" smtClean="0"/>
-              <a:t>31/01/2022</a:t>
+              <a:t>01/02/2022</a:t>
             </a:fld>
             <a:endParaRPr lang="en-GB"/>
           </a:p>
@@ -1012,7 +1012,7 @@
           <a:p>
             <a:fld id="{7CC9B9C6-CD82-4E96-B6AA-3311BE7ABF0D}" type="datetimeFigureOut">
               <a:rPr lang="en-GB" smtClean="0"/>
-              <a:t>31/01/2022</a:t>
+              <a:t>01/02/2022</a:t>
             </a:fld>
             <a:endParaRPr lang="en-GB"/>
           </a:p>
@@ -1244,7 +1244,7 @@
           <a:p>
             <a:fld id="{7CC9B9C6-CD82-4E96-B6AA-3311BE7ABF0D}" type="datetimeFigureOut">
               <a:rPr lang="en-GB" smtClean="0"/>
-              <a:t>31/01/2022</a:t>
+              <a:t>01/02/2022</a:t>
             </a:fld>
             <a:endParaRPr lang="en-GB"/>
           </a:p>
@@ -1611,7 +1611,7 @@
           <a:p>
             <a:fld id="{7CC9B9C6-CD82-4E96-B6AA-3311BE7ABF0D}" type="datetimeFigureOut">
               <a:rPr lang="en-GB" smtClean="0"/>
-              <a:t>31/01/2022</a:t>
+              <a:t>01/02/2022</a:t>
             </a:fld>
             <a:endParaRPr lang="en-GB"/>
           </a:p>
@@ -1729,7 +1729,7 @@
           <a:p>
             <a:fld id="{7CC9B9C6-CD82-4E96-B6AA-3311BE7ABF0D}" type="datetimeFigureOut">
               <a:rPr lang="en-GB" smtClean="0"/>
-              <a:t>31/01/2022</a:t>
+              <a:t>01/02/2022</a:t>
             </a:fld>
             <a:endParaRPr lang="en-GB"/>
           </a:p>
@@ -1824,7 +1824,7 @@
           <a:p>
             <a:fld id="{7CC9B9C6-CD82-4E96-B6AA-3311BE7ABF0D}" type="datetimeFigureOut">
               <a:rPr lang="en-GB" smtClean="0"/>
-              <a:t>31/01/2022</a:t>
+              <a:t>01/02/2022</a:t>
             </a:fld>
             <a:endParaRPr lang="en-GB"/>
           </a:p>
@@ -2101,7 +2101,7 @@
           <a:p>
             <a:fld id="{7CC9B9C6-CD82-4E96-B6AA-3311BE7ABF0D}" type="datetimeFigureOut">
               <a:rPr lang="en-GB" smtClean="0"/>
-              <a:t>31/01/2022</a:t>
+              <a:t>01/02/2022</a:t>
             </a:fld>
             <a:endParaRPr lang="en-GB"/>
           </a:p>
@@ -2354,7 +2354,7 @@
           <a:p>
             <a:fld id="{7CC9B9C6-CD82-4E96-B6AA-3311BE7ABF0D}" type="datetimeFigureOut">
               <a:rPr lang="en-GB" smtClean="0"/>
-              <a:t>31/01/2022</a:t>
+              <a:t>01/02/2022</a:t>
             </a:fld>
             <a:endParaRPr lang="en-GB"/>
           </a:p>
@@ -2567,7 +2567,7 @@
           <a:p>
             <a:fld id="{7CC9B9C6-CD82-4E96-B6AA-3311BE7ABF0D}" type="datetimeFigureOut">
               <a:rPr lang="en-GB" smtClean="0"/>
-              <a:t>31/01/2022</a:t>
+              <a:t>01/02/2022</a:t>
             </a:fld>
             <a:endParaRPr lang="en-GB"/>
           </a:p>
@@ -3073,6 +3073,54 @@
       </p:pic>
       <p:sp>
         <p:nvSpPr>
+          <p:cNvPr id="18" name="Rectangle 17"/>
+          <p:cNvSpPr/>
+          <p:nvPr/>
+        </p:nvSpPr>
+        <p:spPr>
+          <a:xfrm>
+            <a:off x="8415914" y="660612"/>
+            <a:ext cx="2719206" cy="430794"/>
+          </a:xfrm>
+          <a:prstGeom prst="rect">
+            <a:avLst/>
+          </a:prstGeom>
+          <a:solidFill>
+            <a:schemeClr val="bg1"/>
+          </a:solidFill>
+          <a:ln>
+            <a:solidFill>
+              <a:schemeClr val="bg1"/>
+            </a:solidFill>
+          </a:ln>
+        </p:spPr>
+        <p:style>
+          <a:lnRef idx="2">
+            <a:schemeClr val="accent1">
+              <a:shade val="50000"/>
+            </a:schemeClr>
+          </a:lnRef>
+          <a:fillRef idx="1">
+            <a:schemeClr val="accent1"/>
+          </a:fillRef>
+          <a:effectRef idx="0">
+            <a:schemeClr val="accent1"/>
+          </a:effectRef>
+          <a:fontRef idx="minor">
+            <a:schemeClr val="lt1"/>
+          </a:fontRef>
+        </p:style>
+        <p:txBody>
+          <a:bodyPr rtlCol="0" anchor="ctr"/>
+          <a:lstStyle/>
+          <a:p>
+            <a:pPr algn="ctr"/>
+            <a:endParaRPr lang="en-GB"/>
+          </a:p>
+        </p:txBody>
+      </p:sp>
+      <p:sp>
+        <p:nvSpPr>
           <p:cNvPr id="4" name="Rectangle 3"/>
           <p:cNvSpPr/>
           <p:nvPr/>
@@ -3693,6 +3741,47 @@
           <a:xfrm>
             <a:off x="8395856" y="2455671"/>
             <a:ext cx="1533525" cy="409575"/>
+          </a:xfrm>
+          <a:prstGeom prst="rect">
+            <a:avLst/>
+          </a:prstGeom>
+          <a:noFill/>
+          <a:extLst>
+            <a:ext uri="{909E8E84-426E-40DD-AFC4-6F175D3DCCD1}">
+              <a14:hiddenFill xmlns:a14="http://schemas.microsoft.com/office/drawing/2010/main">
+                <a:solidFill>
+                  <a:srgbClr val="FFFFFF"/>
+                </a:solidFill>
+              </a14:hiddenFill>
+            </a:ext>
+          </a:extLst>
+        </p:spPr>
+      </p:pic>
+      <p:pic>
+        <p:nvPicPr>
+          <p:cNvPr id="5" name="Picture 2" descr="https://latex.codecogs.com/gif.latex?%5Cgamma%3D%5Cgamma_%7Bmax%7DN%28R_%7Bmax%7D-R%29%5Cfrac%7B%5Ctau%7D%7B%5Ctau&amp;plus;k_%7B%5Ctau%5Crightarrow%5Cgamma%7D%7D"/>
+          <p:cNvPicPr>
+            <a:picLocks noChangeAspect="1" noChangeArrowheads="1"/>
+          </p:cNvPicPr>
+          <p:nvPr/>
+        </p:nvPicPr>
+        <p:blipFill>
+          <a:blip r:embed="rId7">
+            <a:extLst>
+              <a:ext uri="{28A0092B-C50C-407E-A947-70E740481C1C}">
+                <a14:useLocalDpi xmlns:a14="http://schemas.microsoft.com/office/drawing/2010/main" val="0"/>
+              </a:ext>
+            </a:extLst>
+          </a:blip>
+          <a:srcRect/>
+          <a:stretch>
+            <a:fillRect/>
+          </a:stretch>
+        </p:blipFill>
+        <p:spPr bwMode="auto">
+          <a:xfrm>
+            <a:off x="8448819" y="730430"/>
+            <a:ext cx="2362200" cy="371475"/>
           </a:xfrm>
           <a:prstGeom prst="rect">
             <a:avLst/>
@@ -4857,10 +4946,6 @@
               <a:rPr lang="nl-NL" sz="1400" dirty="0" smtClean="0"/>
               <a:t>N=constant</a:t>
             </a:r>
-            <a:r>
-              <a:rPr lang="nl-NL" sz="1400" dirty="0" smtClean="0"/>
-              <a:t/>
-            </a:r>
             <a:br>
               <a:rPr lang="nl-NL" sz="1400" dirty="0" smtClean="0"/>
             </a:br>
@@ -4907,10 +4992,6 @@
             <a:r>
               <a:rPr lang="nl-NL" sz="1400" dirty="0" smtClean="0"/>
               <a:t>N=constant</a:t>
-            </a:r>
-            <a:r>
-              <a:rPr lang="nl-NL" sz="1400" dirty="0" smtClean="0"/>
-              <a:t/>
             </a:r>
             <a:br>
               <a:rPr lang="nl-NL" sz="1400" dirty="0" smtClean="0"/>

</xml_diff>

<commit_message>
add solver functions for ODE solving -- not everything works, jose should fix it
</commit_message>
<xml_diff>
--- a/projectDescription.pptx
+++ b/projectDescription.pptx
@@ -3127,7 +3127,7 @@
         </p:nvSpPr>
         <p:spPr>
           <a:xfrm>
-            <a:off x="4211782" y="1520388"/>
+            <a:off x="4206371" y="1550992"/>
             <a:ext cx="2022763" cy="430794"/>
           </a:xfrm>
           <a:prstGeom prst="rect">
@@ -3220,7 +3220,7 @@
         </p:blipFill>
         <p:spPr bwMode="auto">
           <a:xfrm>
-            <a:off x="4299526" y="1589231"/>
+            <a:off x="4299525" y="1629919"/>
             <a:ext cx="2495550" cy="361951"/>
           </a:xfrm>
           <a:prstGeom prst="rect">
@@ -3685,26 +3685,6 @@
                 </a:solidFill>
               </a:rPr>
               <a:t>muMax</a:t>
-            </a:r>
-            <a:r>
-              <a:rPr lang="en-GB" b="1" dirty="0" smtClean="0">
-                <a:solidFill>
-                  <a:schemeClr val="accent4">
-                    <a:lumMod val="75000"/>
-                  </a:schemeClr>
-                </a:solidFill>
-              </a:rPr>
-              <a:t>, </a:t>
-            </a:r>
-            <a:r>
-              <a:rPr lang="en-GB" b="1" dirty="0" err="1" smtClean="0">
-                <a:solidFill>
-                  <a:schemeClr val="accent4">
-                    <a:lumMod val="75000"/>
-                  </a:schemeClr>
-                </a:solidFill>
-              </a:rPr>
-              <a:t>Rstarved</a:t>
             </a:r>
             <a:endParaRPr lang="en-GB" b="1" dirty="0">
               <a:solidFill>

</xml_diff>